<commit_message>
sep ex2 & ex3
</commit_message>
<xml_diff>
--- a/exam/presentation.pptx
+++ b/exam/presentation.pptx
@@ -3695,8 +3695,21 @@
           <a:p>
             <a:r>
               <a:rPr lang="en-GB" sz="3400" dirty="0"/>
-              <a:t>Homogeneous coordinates &amp; pinhole camera model (p = K[R t]Q)</a:t>
-            </a:r>
+              <a:t>Homogeneous coordinates &amp; pinhole camera </a:t>
+            </a:r>
+            <a:r>
+              <a:rPr lang="en-GB" sz="3400"/>
+              <a:t>model (q </a:t>
+            </a:r>
+            <a:r>
+              <a:rPr lang="en-GB" sz="3400" dirty="0"/>
+              <a:t>= K[R t</a:t>
+            </a:r>
+            <a:r>
+              <a:rPr lang="en-GB" sz="3400"/>
+              <a:t>]Q = PQ)</a:t>
+            </a:r>
+            <a:endParaRPr lang="en-GB" sz="3400" dirty="0"/>
           </a:p>
         </p:txBody>
       </p:sp>

</xml_diff>

<commit_message>
minor changes till ex10
</commit_message>
<xml_diff>
--- a/exam/presentation.pptx
+++ b/exam/presentation.pptx
@@ -13,6 +13,8 @@
     <p:sldId id="262" r:id="rId7"/>
     <p:sldId id="263" r:id="rId8"/>
     <p:sldId id="264" r:id="rId9"/>
+    <p:sldId id="265" r:id="rId10"/>
+    <p:sldId id="266" r:id="rId11"/>
   </p:sldIdLst>
   <p:sldSz cx="12192000" cy="6858000"/>
   <p:notesSz cx="6858000" cy="9144000"/>
@@ -3733,6 +3735,97 @@
 </p:sld>
 </file>
 
+<file path=ppt/slides/slide10.xml><?xml version="1.0" encoding="utf-8"?>
+<p:sld xmlns:a="http://schemas.openxmlformats.org/drawingml/2006/main" xmlns:r="http://schemas.openxmlformats.org/officeDocument/2006/relationships" xmlns:p="http://schemas.openxmlformats.org/presentationml/2006/main">
+  <p:cSld>
+    <p:spTree>
+      <p:nvGrpSpPr>
+        <p:cNvPr id="1" name=""/>
+        <p:cNvGrpSpPr/>
+        <p:nvPr/>
+      </p:nvGrpSpPr>
+      <p:grpSpPr>
+        <a:xfrm>
+          <a:off x="0" y="0"/>
+          <a:ext cx="0" cy="0"/>
+          <a:chOff x="0" y="0"/>
+          <a:chExt cx="0" cy="0"/>
+        </a:xfrm>
+      </p:grpSpPr>
+      <p:sp>
+        <p:nvSpPr>
+          <p:cNvPr id="2" name="Title 1">
+            <a:extLst>
+              <a:ext uri="{FF2B5EF4-FFF2-40B4-BE49-F238E27FC236}">
+                <a16:creationId xmlns:a16="http://schemas.microsoft.com/office/drawing/2014/main" id="{AD13C403-6C89-CD60-A137-35D8EB3E2C28}"/>
+              </a:ext>
+            </a:extLst>
+          </p:cNvPr>
+          <p:cNvSpPr>
+            <a:spLocks noGrp="1"/>
+          </p:cNvSpPr>
+          <p:nvPr>
+            <p:ph type="title"/>
+          </p:nvPr>
+        </p:nvSpPr>
+        <p:spPr/>
+        <p:txBody>
+          <a:bodyPr/>
+          <a:lstStyle/>
+          <a:p>
+            <a:r>
+              <a:rPr lang="en-GB" dirty="0"/>
+              <a:t>Image stitching</a:t>
+            </a:r>
+          </a:p>
+        </p:txBody>
+      </p:sp>
+      <p:sp>
+        <p:nvSpPr>
+          <p:cNvPr id="3" name="Content Placeholder 2">
+            <a:extLst>
+              <a:ext uri="{FF2B5EF4-FFF2-40B4-BE49-F238E27FC236}">
+                <a16:creationId xmlns:a16="http://schemas.microsoft.com/office/drawing/2014/main" id="{83D55002-B077-E55E-9FEF-17CF5FFF861E}"/>
+              </a:ext>
+            </a:extLst>
+          </p:cNvPr>
+          <p:cNvSpPr>
+            <a:spLocks noGrp="1"/>
+          </p:cNvSpPr>
+          <p:nvPr>
+            <p:ph idx="1"/>
+          </p:nvPr>
+        </p:nvSpPr>
+        <p:spPr/>
+        <p:txBody>
+          <a:bodyPr/>
+          <a:lstStyle/>
+          <a:p>
+            <a:r>
+              <a:rPr lang="en-GB" dirty="0"/>
+              <a:t>RANSAC for fitting </a:t>
+            </a:r>
+            <a:r>
+              <a:rPr lang="en-GB" dirty="0" err="1"/>
+              <a:t>Homographies</a:t>
+            </a:r>
+            <a:endParaRPr lang="en-GB" dirty="0"/>
+          </a:p>
+        </p:txBody>
+      </p:sp>
+    </p:spTree>
+    <p:extLst>
+      <p:ext uri="{BB962C8B-B14F-4D97-AF65-F5344CB8AC3E}">
+        <p14:creationId xmlns:p14="http://schemas.microsoft.com/office/powerpoint/2010/main" val="3669813217"/>
+      </p:ext>
+    </p:extLst>
+  </p:cSld>
+  <p:clrMapOvr>
+    <a:masterClrMapping/>
+  </p:clrMapOvr>
+</p:sld>
+</file>
+
 <file path=ppt/slides/slide2.xml><?xml version="1.0" encoding="utf-8"?>
 <p:sld xmlns:a="http://schemas.openxmlformats.org/drawingml/2006/main" xmlns:r="http://schemas.openxmlformats.org/officeDocument/2006/relationships" xmlns:p="http://schemas.openxmlformats.org/presentationml/2006/main">
   <p:cSld>
@@ -4406,13 +4499,36 @@
         </p:spPr>
         <p:txBody>
           <a:bodyPr>
-            <a:normAutofit/>
+            <a:noAutofit/>
           </a:bodyPr>
           <a:lstStyle/>
           <a:p>
             <a:r>
-              <a:rPr lang="en-US" dirty="0"/>
-              <a:t>Stereo vision &amp; triangulation</a:t>
+              <a:rPr lang="en-US" sz="2800" dirty="0"/>
+              <a:t>Stereo vision &amp; triangulation. Multiview geometry. Essential &amp; Fundamental matrices. </a:t>
+            </a:r>
+            <a:br>
+              <a:rPr lang="en-US" sz="2800" dirty="0"/>
+            </a:br>
+            <a:r>
+              <a:rPr lang="en-US" sz="2800" dirty="0"/>
+              <a:t>0 = </a:t>
+            </a:r>
+            <a:r>
+              <a:rPr lang="en-US" sz="2800" dirty="0" err="1"/>
+              <a:t>p’Ep</a:t>
+            </a:r>
+            <a:r>
+              <a:rPr lang="en-US" sz="2800" dirty="0"/>
+              <a:t>; 0 = </a:t>
+            </a:r>
+            <a:r>
+              <a:rPr lang="en-US" sz="2800" dirty="0" err="1"/>
+              <a:t>q’Fq</a:t>
+            </a:r>
+            <a:r>
+              <a:rPr lang="en-US" sz="2800" dirty="0"/>
+              <a:t>;</a:t>
             </a:r>
           </a:p>
         </p:txBody>
@@ -5127,6 +5243,14 @@
 <file path=ppt/slides/slide8.xml><?xml version="1.0" encoding="utf-8"?>
 <p:sld xmlns:a="http://schemas.openxmlformats.org/drawingml/2006/main" xmlns:r="http://schemas.openxmlformats.org/officeDocument/2006/relationships" xmlns:p="http://schemas.openxmlformats.org/presentationml/2006/main">
   <p:cSld>
+    <p:bg>
+      <p:bgPr>
+        <a:solidFill>
+          <a:schemeClr val="bg1"/>
+        </a:solidFill>
+        <a:effectLst/>
+      </p:bgPr>
+    </p:bg>
     <p:spTree>
       <p:nvGrpSpPr>
         <p:cNvPr id="1" name=""/>
@@ -5143,6 +5267,72 @@
       </p:grpSpPr>
       <p:sp>
         <p:nvSpPr>
+          <p:cNvPr id="10" name="Down Arrow 7">
+            <a:extLst>
+              <a:ext uri="{FF2B5EF4-FFF2-40B4-BE49-F238E27FC236}">
+                <a16:creationId xmlns:a16="http://schemas.microsoft.com/office/drawing/2014/main" id="{D4771268-CB57-404A-9271-370EB28F6090}"/>
+              </a:ext>
+              <a:ext uri="{C183D7F6-B498-43B3-948B-1728B52AA6E4}">
+                <adec:decorative xmlns:adec="http://schemas.microsoft.com/office/drawing/2017/decorative" val="1"/>
+              </a:ext>
+            </a:extLst>
+          </p:cNvPr>
+          <p:cNvSpPr>
+            <a:spLocks noGrp="1" noRot="1" noChangeAspect="1" noMove="1" noResize="1" noEditPoints="1" noAdjustHandles="1" noChangeArrowheads="1" noChangeShapeType="1" noTextEdit="1"/>
+          </p:cNvSpPr>
+          <p:nvPr>
+            <p:extLst>
+              <p:ext uri="{386F3935-93C4-4BCD-93E2-E3B085C9AB24}">
+                <p16:designElem xmlns:p16="http://schemas.microsoft.com/office/powerpoint/2015/main" val="1"/>
+              </p:ext>
+            </p:extLst>
+          </p:nvPr>
+        </p:nvSpPr>
+        <p:spPr>
+          <a:xfrm rot="16200000">
+            <a:off x="800100" y="1491343"/>
+            <a:ext cx="3333749" cy="3499103"/>
+          </a:xfrm>
+          <a:prstGeom prst="downArrow">
+            <a:avLst>
+              <a:gd name="adj1" fmla="val 100000"/>
+              <a:gd name="adj2" fmla="val 15788"/>
+            </a:avLst>
+          </a:prstGeom>
+          <a:solidFill>
+            <a:srgbClr val="404040"/>
+          </a:solidFill>
+          <a:ln w="53975">
+            <a:noFill/>
+          </a:ln>
+        </p:spPr>
+        <p:style>
+          <a:lnRef idx="2">
+            <a:schemeClr val="accent1">
+              <a:shade val="50000"/>
+            </a:schemeClr>
+          </a:lnRef>
+          <a:fillRef idx="1">
+            <a:schemeClr val="accent1"/>
+          </a:fillRef>
+          <a:effectRef idx="0">
+            <a:schemeClr val="accent1"/>
+          </a:effectRef>
+          <a:fontRef idx="minor">
+            <a:schemeClr val="lt1"/>
+          </a:fontRef>
+        </p:style>
+        <p:txBody>
+          <a:bodyPr rtlCol="0" anchor="ctr"/>
+          <a:lstStyle/>
+          <a:p>
+            <a:pPr algn="ctr"/>
+            <a:endParaRPr lang="en-US"/>
+          </a:p>
+        </p:txBody>
+      </p:sp>
+      <p:sp>
+        <p:nvSpPr>
           <p:cNvPr id="2" name="Title 1">
             <a:extLst>
               <a:ext uri="{FF2B5EF4-FFF2-40B4-BE49-F238E27FC236}">
@@ -5157,52 +5347,371 @@
             <p:ph type="title"/>
           </p:nvPr>
         </p:nvSpPr>
-        <p:spPr/>
-        <p:txBody>
-          <a:bodyPr/>
-          <a:lstStyle/>
-          <a:p>
-            <a:r>
-              <a:rPr lang="en-GB" dirty="0"/>
-              <a:t>Robust model fitting. </a:t>
-            </a:r>
-            <a:r>
-              <a:rPr lang="en-GB"/>
-              <a:t>RANSAC</a:t>
-            </a:r>
-            <a:endParaRPr lang="en-GB" dirty="0"/>
-          </a:p>
-        </p:txBody>
-      </p:sp>
-      <p:sp>
-        <p:nvSpPr>
-          <p:cNvPr id="3" name="Content Placeholder 2">
-            <a:extLst>
-              <a:ext uri="{FF2B5EF4-FFF2-40B4-BE49-F238E27FC236}">
-                <a16:creationId xmlns:a16="http://schemas.microsoft.com/office/drawing/2014/main" id="{E02E848C-D45C-AAF9-7272-663BC9282CCA}"/>
-              </a:ext>
-            </a:extLst>
-          </p:cNvPr>
-          <p:cNvSpPr>
-            <a:spLocks noGrp="1"/>
-          </p:cNvSpPr>
+        <p:spPr>
+          <a:xfrm>
+            <a:off x="1028700" y="1967266"/>
+            <a:ext cx="2628900" cy="2547257"/>
+          </a:xfrm>
+          <a:noFill/>
+        </p:spPr>
+        <p:txBody>
+          <a:bodyPr vert="horz" lIns="91440" tIns="45720" rIns="91440" bIns="45720" rtlCol="0" anchor="ctr">
+            <a:normAutofit/>
+          </a:bodyPr>
+          <a:lstStyle/>
+          <a:p>
+            <a:pPr algn="ctr"/>
+            <a:r>
+              <a:rPr lang="en-US" sz="3600" kern="1200">
+                <a:solidFill>
+                  <a:srgbClr val="FFFFFF"/>
+                </a:solidFill>
+                <a:latin typeface="+mj-lt"/>
+                <a:ea typeface="+mj-ea"/>
+                <a:cs typeface="+mj-cs"/>
+              </a:rPr>
+              <a:t>Robust model fitting. RANSAC</a:t>
+            </a:r>
+          </a:p>
+        </p:txBody>
+      </p:sp>
+      <p:pic>
+        <p:nvPicPr>
+          <p:cNvPr id="5" name="Content Placeholder 4" descr="Chart, scatter chart&#10;&#10;Description automatically generated">
+            <a:extLst>
+              <a:ext uri="{FF2B5EF4-FFF2-40B4-BE49-F238E27FC236}">
+                <a16:creationId xmlns:a16="http://schemas.microsoft.com/office/drawing/2014/main" id="{7DEF981F-4040-563E-00B9-9A86EDA22E53}"/>
+              </a:ext>
+            </a:extLst>
+          </p:cNvPr>
+          <p:cNvPicPr>
+            <a:picLocks noGrp="1" noChangeAspect="1"/>
+          </p:cNvPicPr>
           <p:nvPr>
             <p:ph idx="1"/>
           </p:nvPr>
-        </p:nvSpPr>
-        <p:spPr/>
-        <p:txBody>
-          <a:bodyPr/>
-          <a:lstStyle/>
-          <a:p>
-            <a:endParaRPr lang="en-GB"/>
-          </a:p>
-        </p:txBody>
-      </p:sp>
+        </p:nvPicPr>
+        <p:blipFill>
+          <a:blip r:embed="rId2"/>
+          <a:stretch>
+            <a:fillRect/>
+          </a:stretch>
+        </p:blipFill>
+        <p:spPr>
+          <a:xfrm>
+            <a:off x="4777316" y="1224108"/>
+            <a:ext cx="6780700" cy="4407455"/>
+          </a:xfrm>
+          <a:prstGeom prst="rect">
+            <a:avLst/>
+          </a:prstGeom>
+        </p:spPr>
+      </p:pic>
     </p:spTree>
     <p:extLst>
       <p:ext uri="{BB962C8B-B14F-4D97-AF65-F5344CB8AC3E}">
         <p14:creationId xmlns:p14="http://schemas.microsoft.com/office/powerpoint/2010/main" val="2849089626"/>
+      </p:ext>
+    </p:extLst>
+  </p:cSld>
+  <p:clrMapOvr>
+    <a:masterClrMapping/>
+  </p:clrMapOvr>
+</p:sld>
+</file>
+
+<file path=ppt/slides/slide9.xml><?xml version="1.0" encoding="utf-8"?>
+<p:sld xmlns:a="http://schemas.openxmlformats.org/drawingml/2006/main" xmlns:r="http://schemas.openxmlformats.org/officeDocument/2006/relationships" xmlns:p="http://schemas.openxmlformats.org/presentationml/2006/main">
+  <p:cSld>
+    <p:bg>
+      <p:bgPr>
+        <a:solidFill>
+          <a:schemeClr val="bg1"/>
+        </a:solidFill>
+        <a:effectLst/>
+      </p:bgPr>
+    </p:bg>
+    <p:spTree>
+      <p:nvGrpSpPr>
+        <p:cNvPr id="1" name=""/>
+        <p:cNvGrpSpPr/>
+        <p:nvPr/>
+      </p:nvGrpSpPr>
+      <p:grpSpPr>
+        <a:xfrm>
+          <a:off x="0" y="0"/>
+          <a:ext cx="0" cy="0"/>
+          <a:chOff x="0" y="0"/>
+          <a:chExt cx="0" cy="0"/>
+        </a:xfrm>
+      </p:grpSpPr>
+      <p:sp>
+        <p:nvSpPr>
+          <p:cNvPr id="12" name="Rectangle 11">
+            <a:extLst>
+              <a:ext uri="{FF2B5EF4-FFF2-40B4-BE49-F238E27FC236}">
+                <a16:creationId xmlns:a16="http://schemas.microsoft.com/office/drawing/2014/main" id="{FF9B822F-893E-44C8-963C-64F50ACECBB2}"/>
+              </a:ext>
+              <a:ext uri="{C183D7F6-B498-43B3-948B-1728B52AA6E4}">
+                <adec:decorative xmlns:adec="http://schemas.microsoft.com/office/drawing/2017/decorative" val="1"/>
+              </a:ext>
+            </a:extLst>
+          </p:cNvPr>
+          <p:cNvSpPr>
+            <a:spLocks noGrp="1" noRot="1" noChangeAspect="1" noMove="1" noResize="1" noEditPoints="1" noAdjustHandles="1" noChangeArrowheads="1" noChangeShapeType="1" noTextEdit="1"/>
+          </p:cNvSpPr>
+          <p:nvPr>
+            <p:extLst>
+              <p:ext uri="{386F3935-93C4-4BCD-93E2-E3B085C9AB24}">
+                <p16:designElem xmlns:p16="http://schemas.microsoft.com/office/powerpoint/2015/main" val="1"/>
+              </p:ext>
+            </p:extLst>
+          </p:nvPr>
+        </p:nvSpPr>
+        <p:spPr>
+          <a:xfrm>
+            <a:off x="0" y="0"/>
+            <a:ext cx="12192000" cy="6858000"/>
+          </a:xfrm>
+          <a:prstGeom prst="rect">
+            <a:avLst/>
+          </a:prstGeom>
+          <a:solidFill>
+            <a:schemeClr val="bg1"/>
+          </a:solidFill>
+          <a:ln w="12700" cap="flat" cmpd="sng" algn="ctr">
+            <a:noFill/>
+            <a:prstDash val="solid"/>
+            <a:miter lim="800000"/>
+          </a:ln>
+          <a:effectLst/>
+          <a:extLst>
+            <a:ext uri="{91240B29-F687-4F45-9708-019B960494DF}">
+              <a14:hiddenLine xmlns:a14="http://schemas.microsoft.com/office/drawing/2010/main" w="12700" cap="flat" cmpd="sng" algn="ctr">
+                <a:solidFill>
+                  <a:schemeClr val="accent1">
+                    <a:shade val="50000"/>
+                  </a:schemeClr>
+                </a:solidFill>
+                <a:prstDash val="solid"/>
+                <a:miter lim="800000"/>
+              </a14:hiddenLine>
+            </a:ext>
+          </a:extLst>
+        </p:spPr>
+        <p:style>
+          <a:lnRef idx="2">
+            <a:schemeClr val="accent1">
+              <a:shade val="50000"/>
+            </a:schemeClr>
+          </a:lnRef>
+          <a:fillRef idx="1">
+            <a:schemeClr val="accent1"/>
+          </a:fillRef>
+          <a:effectRef idx="0">
+            <a:schemeClr val="accent1"/>
+          </a:effectRef>
+          <a:fontRef idx="minor">
+            <a:schemeClr val="lt1"/>
+          </a:fontRef>
+        </p:style>
+        <p:txBody>
+          <a:bodyPr rtlCol="0" anchor="ctr"/>
+          <a:lstStyle/>
+          <a:p>
+            <a:pPr algn="ctr"/>
+            <a:endParaRPr lang="en-US"/>
+          </a:p>
+        </p:txBody>
+      </p:sp>
+      <p:sp>
+        <p:nvSpPr>
+          <p:cNvPr id="14" name="Rectangle 13">
+            <a:extLst>
+              <a:ext uri="{FF2B5EF4-FFF2-40B4-BE49-F238E27FC236}">
+                <a16:creationId xmlns:a16="http://schemas.microsoft.com/office/drawing/2014/main" id="{EBF87945-A001-489F-9D9B-7D9435F0B9CA}"/>
+              </a:ext>
+              <a:ext uri="{C183D7F6-B498-43B3-948B-1728B52AA6E4}">
+                <adec:decorative xmlns:adec="http://schemas.microsoft.com/office/drawing/2017/decorative" val="1"/>
+              </a:ext>
+            </a:extLst>
+          </p:cNvPr>
+          <p:cNvSpPr>
+            <a:spLocks noGrp="1" noRot="1" noChangeAspect="1" noMove="1" noResize="1" noEditPoints="1" noAdjustHandles="1" noChangeArrowheads="1" noChangeShapeType="1" noTextEdit="1"/>
+          </p:cNvSpPr>
+          <p:nvPr>
+            <p:extLst>
+              <p:ext uri="{386F3935-93C4-4BCD-93E2-E3B085C9AB24}">
+                <p16:designElem xmlns:p16="http://schemas.microsoft.com/office/powerpoint/2015/main" val="1"/>
+              </p:ext>
+            </p:extLst>
+          </p:nvPr>
+        </p:nvSpPr>
+        <p:spPr>
+          <a:xfrm>
+            <a:off x="548639" y="347471"/>
+            <a:ext cx="11100816" cy="1801368"/>
+          </a:xfrm>
+          <a:prstGeom prst="rect">
+            <a:avLst/>
+          </a:prstGeom>
+          <a:solidFill>
+            <a:schemeClr val="tx1">
+              <a:lumMod val="75000"/>
+              <a:lumOff val="25000"/>
+            </a:schemeClr>
+          </a:solidFill>
+          <a:ln>
+            <a:noFill/>
+          </a:ln>
+        </p:spPr>
+        <p:style>
+          <a:lnRef idx="2">
+            <a:schemeClr val="accent1">
+              <a:shade val="50000"/>
+            </a:schemeClr>
+          </a:lnRef>
+          <a:fillRef idx="1">
+            <a:schemeClr val="accent1"/>
+          </a:fillRef>
+          <a:effectRef idx="0">
+            <a:schemeClr val="accent1"/>
+          </a:effectRef>
+          <a:fontRef idx="minor">
+            <a:schemeClr val="lt1"/>
+          </a:fontRef>
+        </p:style>
+        <p:txBody>
+          <a:bodyPr rtlCol="0" anchor="ctr"/>
+          <a:lstStyle/>
+          <a:p>
+            <a:pPr algn="ctr"/>
+            <a:endParaRPr lang="en-US"/>
+          </a:p>
+        </p:txBody>
+      </p:sp>
+      <p:sp>
+        <p:nvSpPr>
+          <p:cNvPr id="2" name="Title 1">
+            <a:extLst>
+              <a:ext uri="{FF2B5EF4-FFF2-40B4-BE49-F238E27FC236}">
+                <a16:creationId xmlns:a16="http://schemas.microsoft.com/office/drawing/2014/main" id="{DCE2D076-A657-5DE0-B6E2-0C3693199F42}"/>
+              </a:ext>
+            </a:extLst>
+          </p:cNvPr>
+          <p:cNvSpPr>
+            <a:spLocks noGrp="1"/>
+          </p:cNvSpPr>
+          <p:nvPr>
+            <p:ph type="title"/>
+          </p:nvPr>
+        </p:nvSpPr>
+        <p:spPr>
+          <a:xfrm>
+            <a:off x="838200" y="585216"/>
+            <a:ext cx="10515600" cy="1325563"/>
+          </a:xfrm>
+        </p:spPr>
+        <p:txBody>
+          <a:bodyPr>
+            <a:normAutofit/>
+          </a:bodyPr>
+          <a:lstStyle/>
+          <a:p>
+            <a:r>
+              <a:rPr lang="en-GB">
+                <a:solidFill>
+                  <a:schemeClr val="bg1"/>
+                </a:solidFill>
+              </a:rPr>
+              <a:t>Constrained geometry feature matching</a:t>
+            </a:r>
+          </a:p>
+        </p:txBody>
+      </p:sp>
+      <p:pic>
+        <p:nvPicPr>
+          <p:cNvPr id="5" name="Content Placeholder 4">
+            <a:extLst>
+              <a:ext uri="{FF2B5EF4-FFF2-40B4-BE49-F238E27FC236}">
+                <a16:creationId xmlns:a16="http://schemas.microsoft.com/office/drawing/2014/main" id="{C95C120B-31FF-7A3E-0F72-CB0EDD8A99B9}"/>
+              </a:ext>
+            </a:extLst>
+          </p:cNvPr>
+          <p:cNvPicPr>
+            <a:picLocks noChangeAspect="1"/>
+          </p:cNvPicPr>
+          <p:nvPr/>
+        </p:nvPicPr>
+        <p:blipFill rotWithShape="1">
+          <a:blip r:embed="rId2"/>
+          <a:srcRect l="13879" r="20099"/>
+          <a:stretch/>
+        </p:blipFill>
+        <p:spPr>
+          <a:xfrm>
+            <a:off x="841248" y="2516777"/>
+            <a:ext cx="6236208" cy="3660185"/>
+          </a:xfrm>
+          <a:prstGeom prst="rect">
+            <a:avLst/>
+          </a:prstGeom>
+        </p:spPr>
+      </p:pic>
+      <p:sp>
+        <p:nvSpPr>
+          <p:cNvPr id="9" name="Content Placeholder 8">
+            <a:extLst>
+              <a:ext uri="{FF2B5EF4-FFF2-40B4-BE49-F238E27FC236}">
+                <a16:creationId xmlns:a16="http://schemas.microsoft.com/office/drawing/2014/main" id="{F1DDBA16-1D65-03B9-21D0-CE0389C080F0}"/>
+              </a:ext>
+            </a:extLst>
+          </p:cNvPr>
+          <p:cNvSpPr>
+            <a:spLocks noGrp="1"/>
+          </p:cNvSpPr>
+          <p:nvPr>
+            <p:ph idx="1"/>
+          </p:nvPr>
+        </p:nvSpPr>
+        <p:spPr>
+          <a:xfrm>
+            <a:off x="7546848" y="2516777"/>
+            <a:ext cx="3803904" cy="3660185"/>
+          </a:xfrm>
+        </p:spPr>
+        <p:txBody>
+          <a:bodyPr anchor="ctr">
+            <a:normAutofit/>
+          </a:bodyPr>
+          <a:lstStyle/>
+          <a:p>
+            <a:r>
+              <a:rPr lang="en-US" sz="2200" dirty="0"/>
+              <a:t>Eight-point algorithm</a:t>
+            </a:r>
+          </a:p>
+          <a:p>
+            <a:r>
+              <a:rPr lang="en-US" sz="2200" dirty="0"/>
+              <a:t>Fundamental matrix</a:t>
+            </a:r>
+          </a:p>
+          <a:p>
+            <a:r>
+              <a:rPr lang="en-US" sz="2200" dirty="0"/>
+              <a:t>RANSAC</a:t>
+            </a:r>
+          </a:p>
+          <a:p>
+            <a:endParaRPr lang="en-US" sz="2200" dirty="0"/>
+          </a:p>
+        </p:txBody>
+      </p:sp>
+    </p:spTree>
+    <p:extLst>
+      <p:ext uri="{BB962C8B-B14F-4D97-AF65-F5344CB8AC3E}">
+        <p14:creationId xmlns:p14="http://schemas.microsoft.com/office/powerpoint/2010/main" val="871574202"/>
       </p:ext>
     </p:extLst>
   </p:cSld>

</xml_diff>